<commit_message>
clean the c code base
</commit_message>
<xml_diff>
--- a/slides/CSE237Bfinalproject_v3.pptx
+++ b/slides/CSE237Bfinalproject_v3.pptx
@@ -206,7 +206,7 @@
           <a:p>
             <a:fld id="{CFE0DA16-5DA3-4A7A-882F-427653F5F422}" type="datetimeFigureOut">
               <a:rPr lang="en-US" smtClean="0"/>
-              <a:t>6/7/2015</a:t>
+              <a:t>6/9/2015</a:t>
             </a:fld>
             <a:endParaRPr lang="en-US"/>
           </a:p>
@@ -655,7 +655,7 @@
           <a:p>
             <a:fld id="{37E5A03D-2349-40FD-B0A9-63E5EDB86215}" type="datetime1">
               <a:rPr lang="en-US" smtClean="0"/>
-              <a:t>6/7/2015</a:t>
+              <a:t>6/9/2015</a:t>
             </a:fld>
             <a:endParaRPr lang="en-US"/>
           </a:p>
@@ -832,7 +832,7 @@
           <a:p>
             <a:fld id="{A5082C4A-13A0-4BBA-9A4A-994F8341D266}" type="datetime1">
               <a:rPr lang="en-US" smtClean="0"/>
-              <a:t>6/7/2015</a:t>
+              <a:t>6/9/2015</a:t>
             </a:fld>
             <a:endParaRPr lang="en-US"/>
           </a:p>
@@ -1012,7 +1012,7 @@
           <a:p>
             <a:fld id="{B5694603-F739-49DC-BFFE-260B5117C07F}" type="datetime1">
               <a:rPr lang="en-US" smtClean="0"/>
-              <a:t>6/7/2015</a:t>
+              <a:t>6/9/2015</a:t>
             </a:fld>
             <a:endParaRPr lang="en-US"/>
           </a:p>
@@ -1220,7 +1220,7 @@
           <a:p>
             <a:fld id="{57AE8D16-8987-41C9-B620-9B3823952743}" type="datetime1">
               <a:rPr lang="en-US" smtClean="0"/>
-              <a:t>6/7/2015</a:t>
+              <a:t>6/9/2015</a:t>
             </a:fld>
             <a:endParaRPr lang="en-US"/>
           </a:p>
@@ -1557,7 +1557,7 @@
           <a:p>
             <a:fld id="{DAEB8039-3733-4427-A41E-95AB639E724D}" type="datetime1">
               <a:rPr lang="en-US" smtClean="0"/>
-              <a:t>6/7/2015</a:t>
+              <a:t>6/9/2015</a:t>
             </a:fld>
             <a:endParaRPr lang="en-US"/>
           </a:p>
@@ -1845,7 +1845,7 @@
           <a:p>
             <a:fld id="{7E13521B-24EA-4BFE-9ABA-700B2882EE7F}" type="datetime1">
               <a:rPr lang="en-US" smtClean="0"/>
-              <a:t>6/7/2015</a:t>
+              <a:t>6/9/2015</a:t>
             </a:fld>
             <a:endParaRPr lang="en-US"/>
           </a:p>
@@ -2267,7 +2267,7 @@
           <a:p>
             <a:fld id="{47294265-B01B-4DF1-A703-CEFD5A8AEE16}" type="datetime1">
               <a:rPr lang="en-US" smtClean="0"/>
-              <a:t>6/7/2015</a:t>
+              <a:t>6/9/2015</a:t>
             </a:fld>
             <a:endParaRPr lang="en-US"/>
           </a:p>
@@ -2385,7 +2385,7 @@
           <a:p>
             <a:fld id="{B768FEF6-80AC-4243-A247-880FED968EBF}" type="datetime1">
               <a:rPr lang="en-US" smtClean="0"/>
-              <a:t>6/7/2015</a:t>
+              <a:t>6/9/2015</a:t>
             </a:fld>
             <a:endParaRPr lang="en-US"/>
           </a:p>
@@ -2480,7 +2480,7 @@
           <a:p>
             <a:fld id="{1B06774B-194D-4268-ABC1-22F883707315}" type="datetime1">
               <a:rPr lang="en-US" smtClean="0"/>
-              <a:t>6/7/2015</a:t>
+              <a:t>6/9/2015</a:t>
             </a:fld>
             <a:endParaRPr lang="en-US"/>
           </a:p>
@@ -2757,7 +2757,7 @@
           <a:p>
             <a:fld id="{42FB1601-556D-4130-B760-72F61DC58EA2}" type="datetime1">
               <a:rPr lang="en-US" smtClean="0"/>
-              <a:t>6/7/2015</a:t>
+              <a:t>6/9/2015</a:t>
             </a:fld>
             <a:endParaRPr lang="en-US"/>
           </a:p>
@@ -3010,7 +3010,7 @@
           <a:p>
             <a:fld id="{DA721ED5-ED5C-4C99-B780-C464578E6537}" type="datetime1">
               <a:rPr lang="en-US" smtClean="0"/>
-              <a:t>6/7/2015</a:t>
+              <a:t>6/9/2015</a:t>
             </a:fld>
             <a:endParaRPr lang="en-US"/>
           </a:p>
@@ -3223,7 +3223,7 @@
           <a:p>
             <a:fld id="{C895B9F0-2957-488B-9177-2385DB288CD1}" type="datetime1">
               <a:rPr lang="en-US" smtClean="0"/>
-              <a:t>6/7/2015</a:t>
+              <a:t>6/9/2015</a:t>
             </a:fld>
             <a:endParaRPr lang="en-US"/>
           </a:p>
@@ -3912,7 +3912,7 @@
         </p:nvSpPr>
         <p:spPr>
           <a:xfrm>
-            <a:off x="4649860" y="2895599"/>
+            <a:off x="4649860" y="2819400"/>
             <a:ext cx="3768871" cy="3804575"/>
           </a:xfrm>
           <a:prstGeom prst="rect">
@@ -3955,7 +3955,7 @@
         </p:nvSpPr>
         <p:spPr>
           <a:xfrm>
-            <a:off x="228600" y="0"/>
+            <a:off x="228600" y="76200"/>
             <a:ext cx="4114800" cy="6705600"/>
           </a:xfrm>
           <a:prstGeom prst="rect">
@@ -4014,15 +4014,7 @@
           <a:p>
             <a:r>
               <a:rPr lang="en-US" sz="3600" b="1" dirty="0" smtClean="0"/>
-              <a:t>Flow of the </a:t>
-            </a:r>
-            <a:r>
-              <a:rPr lang="en-US" sz="3600" b="1" dirty="0" smtClean="0"/>
-              <a:t>“</a:t>
-            </a:r>
-            <a:r>
-              <a:rPr lang="en-US" sz="3600" b="1" dirty="0" smtClean="0"/>
-              <a:t>Busy” Application</a:t>
+              <a:t>Flow of the “Busy” Application</a:t>
             </a:r>
             <a:endParaRPr lang="en-US" sz="3600" b="1" dirty="0"/>
           </a:p>
@@ -4240,8 +4232,8 @@
           </a:p>
         </p:txBody>
       </p:sp>
-      <mc:AlternateContent xmlns:mc="http://schemas.openxmlformats.org/markup-compatibility/2006">
-        <mc:Choice xmlns:a14="http://schemas.microsoft.com/office/drawing/2010/main" Requires="a14">
+      <mc:AlternateContent xmlns:mc="http://schemas.openxmlformats.org/markup-compatibility/2006" xmlns:a14="http://schemas.microsoft.com/office/drawing/2010/main">
+        <mc:Choice Requires="a14">
           <p:sp>
             <p:nvSpPr>
               <p:cNvPr id="10" name="TextBox 9"/>
@@ -4334,7 +4326,7 @@
             </p:txBody>
           </p:sp>
         </mc:Choice>
-        <mc:Fallback>
+        <mc:Fallback xmlns="">
           <p:sp>
             <p:nvSpPr>
               <p:cNvPr id="10" name="TextBox 9"/>
@@ -6446,7 +6438,6 @@
               <a:rPr lang="en-US" sz="2400" dirty="0" smtClean="0"/>
               <a:t> </a:t>
             </a:r>
-            <a:endParaRPr lang="en-US" sz="2400" dirty="0" smtClean="0"/>
           </a:p>
           <a:p>
             <a:endParaRPr lang="en-US" sz="2400" dirty="0" smtClean="0"/>
@@ -6586,23 +6577,13 @@
             </a:r>
             <a:r>
               <a:rPr lang="en-US" sz="2000" dirty="0" smtClean="0"/>
-              <a:t>from original website of Go </a:t>
-            </a:r>
-            <a:r>
-              <a:rPr lang="en-US" sz="2000" dirty="0" smtClean="0"/>
-              <a:t>Language </a:t>
+              <a:t>from original website of Go Language </a:t>
             </a:r>
             <a:r>
               <a:rPr lang="en-US" sz="2000" dirty="0" smtClean="0">
                 <a:hlinkClick r:id="rId3"/>
               </a:rPr>
-              <a:t>https://golang.org/doc</a:t>
-            </a:r>
-            <a:r>
-              <a:rPr lang="en-US" sz="2000" dirty="0" smtClean="0">
-                <a:hlinkClick r:id="rId3"/>
-              </a:rPr>
-              <a:t>/</a:t>
+              <a:t>https://golang.org/doc/</a:t>
             </a:r>
             <a:endParaRPr lang="en-US" sz="2000" dirty="0" smtClean="0"/>
           </a:p>
@@ -7034,11 +7015,7 @@
           <a:p>
             <a:r>
               <a:rPr lang="en-US" dirty="0" smtClean="0"/>
-              <a:t>Data loss and </a:t>
-            </a:r>
-            <a:r>
-              <a:rPr lang="en-US" dirty="0" smtClean="0"/>
-              <a:t>treatment </a:t>
+              <a:t>Data loss and treatment </a:t>
             </a:r>
           </a:p>
           <a:p>
@@ -7046,16 +7023,11 @@
               <a:rPr lang="en-US" dirty="0" smtClean="0"/>
               <a:t>Application design</a:t>
             </a:r>
-            <a:endParaRPr lang="en-US" dirty="0" smtClean="0"/>
           </a:p>
           <a:p>
             <a:r>
               <a:rPr lang="en-US" dirty="0" smtClean="0"/>
-              <a:t>Corresponding optimization </a:t>
-            </a:r>
-            <a:r>
-              <a:rPr lang="en-US" dirty="0" smtClean="0"/>
-              <a:t>approach and results </a:t>
+              <a:t>Corresponding optimization approach and results </a:t>
             </a:r>
           </a:p>
           <a:p>
@@ -12389,11 +12361,7 @@
           <a:p>
             <a:r>
               <a:rPr lang="en-US" sz="2000" dirty="0" smtClean="0"/>
-              <a:t>Limit </a:t>
-            </a:r>
-            <a:r>
-              <a:rPr lang="en-US" sz="2000" dirty="0" smtClean="0"/>
-              <a:t>the package size to </a:t>
+              <a:t>Limit the package size to </a:t>
             </a:r>
             <a:r>
               <a:rPr lang="en-US" sz="2000" dirty="0" smtClean="0">
@@ -12765,8 +12733,8 @@
           </a:p>
         </p:txBody>
       </p:sp>
-      <mc:AlternateContent xmlns:mc="http://schemas.openxmlformats.org/markup-compatibility/2006">
-        <mc:Choice xmlns:a14="http://schemas.microsoft.com/office/drawing/2010/main" Requires="a14">
+      <mc:AlternateContent xmlns:mc="http://schemas.openxmlformats.org/markup-compatibility/2006" xmlns:a14="http://schemas.microsoft.com/office/drawing/2010/main">
+        <mc:Choice Requires="a14">
           <p:sp>
             <p:nvSpPr>
               <p:cNvPr id="3" name="内容占位符 2"/>
@@ -12829,17 +12797,8 @@
               <a:p>
                 <a:r>
                   <a:rPr lang="en-US" dirty="0" smtClean="0"/>
-                  <a:t>The jitter is 2.5% of </a:t>
+                  <a:t>The jitter is 2.5% of the average delay </a:t>
                 </a:r>
-                <a:r>
-                  <a:rPr lang="en-US" dirty="0" smtClean="0"/>
-                  <a:t>the </a:t>
-                </a:r>
-                <a:r>
-                  <a:rPr lang="en-US" dirty="0" smtClean="0"/>
-                  <a:t>average delay </a:t>
-                </a:r>
-                <a:endParaRPr lang="en-US" dirty="0" smtClean="0"/>
               </a:p>
               <a:p>
                 <a:endParaRPr lang="en-US" dirty="0"/>
@@ -12854,7 +12813,7 @@
             </p:txBody>
           </p:sp>
         </mc:Choice>
-        <mc:Fallback>
+        <mc:Fallback xmlns="">
           <p:sp>
             <p:nvSpPr>
               <p:cNvPr id="3" name="内容占位符 2"/>

</xml_diff>